<commit_message>
update to the PPT
</commit_message>
<xml_diff>
--- a/The Vacationer.pptx
+++ b/The Vacationer.pptx
@@ -17,7 +17,6 @@
     <p:sldId id="265" r:id="rId11"/>
     <p:sldId id="266" r:id="rId12"/>
     <p:sldId id="267" r:id="rId13"/>
-    <p:sldId id="268" r:id="rId14"/>
   </p:sldIdLst>
   <p:sldSz cx="12192000" cy="6858000"/>
   <p:notesSz cx="6858000" cy="9144000"/>
@@ -6451,116 +6450,6 @@
 </p:sld>
 </file>
 
-<file path=ppt/slides/slide13.xml><?xml version="1.0" encoding="utf-8"?>
-<p:sld xmlns:a="http://schemas.openxmlformats.org/drawingml/2006/main" xmlns:r="http://schemas.openxmlformats.org/officeDocument/2006/relationships" xmlns:p="http://schemas.openxmlformats.org/presentationml/2006/main">
-  <p:cSld>
-    <p:spTree>
-      <p:nvGrpSpPr>
-        <p:cNvPr id="1" name=""/>
-        <p:cNvGrpSpPr/>
-        <p:nvPr/>
-      </p:nvGrpSpPr>
-      <p:grpSpPr>
-        <a:xfrm>
-          <a:off x="0" y="0"/>
-          <a:ext cx="0" cy="0"/>
-          <a:chOff x="0" y="0"/>
-          <a:chExt cx="0" cy="0"/>
-        </a:xfrm>
-      </p:grpSpPr>
-      <p:sp>
-        <p:nvSpPr>
-          <p:cNvPr id="2" name="Title 1"/>
-          <p:cNvSpPr>
-            <a:spLocks noGrp="1"/>
-          </p:cNvSpPr>
-          <p:nvPr>
-            <p:ph type="title"/>
-          </p:nvPr>
-        </p:nvSpPr>
-        <p:spPr>
-          <a:xfrm>
-            <a:off x="1295402" y="330197"/>
-            <a:ext cx="9601196" cy="1303867"/>
-          </a:xfrm>
-        </p:spPr>
-        <p:txBody>
-          <a:bodyPr/>
-          <a:lstStyle/>
-          <a:p>
-            <a:r>
-              <a:rPr lang="en-AU" dirty="0" smtClean="0"/>
-              <a:t>Future Plans of the Product </a:t>
-            </a:r>
-            <a:r>
-              <a:rPr lang="en-AU" sz="2000" dirty="0" smtClean="0"/>
-              <a:t>contd..</a:t>
-            </a:r>
-            <a:endParaRPr lang="en-AU" sz="2000" dirty="0"/>
-          </a:p>
-        </p:txBody>
-      </p:sp>
-      <p:sp>
-        <p:nvSpPr>
-          <p:cNvPr id="3" name="Content Placeholder 2"/>
-          <p:cNvSpPr>
-            <a:spLocks noGrp="1"/>
-          </p:cNvSpPr>
-          <p:nvPr>
-            <p:ph idx="1"/>
-          </p:nvPr>
-        </p:nvSpPr>
-        <p:spPr/>
-        <p:txBody>
-          <a:bodyPr numCol="1">
-            <a:normAutofit/>
-          </a:bodyPr>
-          <a:lstStyle/>
-          <a:p>
-            <a:pPr marL="0" indent="0" algn="just">
-              <a:buNone/>
-            </a:pPr>
-            <a:r>
-              <a:rPr lang="en-AU" dirty="0" smtClean="0"/>
-              <a:t>Develop the mobile version</a:t>
-            </a:r>
-          </a:p>
-          <a:p>
-            <a:pPr marL="457200" indent="-457200" algn="just">
-              <a:buFont typeface="+mj-lt"/>
-              <a:buAutoNum type="arabicPeriod"/>
-            </a:pPr>
-            <a:endParaRPr lang="en-AU" dirty="0" smtClean="0"/>
-          </a:p>
-          <a:p>
-            <a:pPr marL="457200" indent="-457200">
-              <a:buFont typeface="+mj-lt"/>
-              <a:buAutoNum type="arabicPeriod"/>
-            </a:pPr>
-            <a:endParaRPr lang="en-AU" dirty="0"/>
-          </a:p>
-        </p:txBody>
-      </p:sp>
-    </p:spTree>
-    <p:extLst>
-      <p:ext uri="{BB962C8B-B14F-4D97-AF65-F5344CB8AC3E}">
-        <p14:creationId xmlns:p14="http://schemas.microsoft.com/office/powerpoint/2010/main" val="1603887581"/>
-      </p:ext>
-    </p:extLst>
-  </p:cSld>
-  <p:clrMapOvr>
-    <a:masterClrMapping/>
-  </p:clrMapOvr>
-  <p:timing>
-    <p:tnLst>
-      <p:par>
-        <p:cTn id="1" dur="indefinite" restart="never" nodeType="tmRoot"/>
-      </p:par>
-    </p:tnLst>
-  </p:timing>
-</p:sld>
-</file>
-
 <file path=ppt/slides/slide2.xml><?xml version="1.0" encoding="utf-8"?>
 <p:sld xmlns:a="http://schemas.openxmlformats.org/drawingml/2006/main" xmlns:r="http://schemas.openxmlformats.org/officeDocument/2006/relationships" xmlns:p="http://schemas.openxmlformats.org/presentationml/2006/main">
   <p:cSld>

</xml_diff>